<commit_message>
Updated Presentation - with a couple of notebook edits
</commit_message>
<xml_diff>
--- a/Final Project - Presentation.pptx
+++ b/Final Project - Presentation.pptx
@@ -37,8 +37,8 @@
     <p:sldId id="309" r:id="rId28"/>
     <p:sldId id="310" r:id="rId29"/>
     <p:sldId id="311" r:id="rId30"/>
-    <p:sldId id="332" r:id="rId31"/>
-    <p:sldId id="331" r:id="rId32"/>
+    <p:sldId id="331" r:id="rId31"/>
+    <p:sldId id="332" r:id="rId32"/>
     <p:sldId id="312" r:id="rId33"/>
     <p:sldId id="273" r:id="rId34"/>
     <p:sldId id="314" r:id="rId35"/>
@@ -63,9 +63,10 @@
       <p:boldItalic r:id="rId49"/>
     </p:embeddedFont>
     <p:embeddedFont>
-      <p:font typeface="Quicksand" panose="020B0604020202020204" charset="0"/>
+      <p:font typeface="Quicksand" panose="02070303000000060000" pitchFamily="18" charset="77"/>
       <p:regular r:id="rId50"/>
       <p:bold r:id="rId51"/>
+      <p:italic r:id="rId52"/>
     </p:embeddedFont>
   </p:embeddedFontLst>
   <p:defaultTextStyle>
@@ -302,7 +303,7 @@
       <p15:sldGuideLst xmlns:p15="http://schemas.microsoft.com/office/powerpoint/2012/main"/>
     </p:ext>
     <p:ext uri="http://customooxmlschemas.google.com/">
-      <go:slidesCustomData xmlns="" xmlns:mc="http://schemas.openxmlformats.org/markup-compatibility/2006" xmlns:mv="urn:schemas-microsoft-com:mac:vml" xmlns:c="http://schemas.openxmlformats.org/drawingml/2006/chart" xmlns:dgm="http://schemas.openxmlformats.org/drawingml/2006/diagram" xmlns:o="urn:schemas-microsoft-com:office:office" xmlns:v="urn:schemas-microsoft-com:vml" xmlns:pvml="urn:schemas-microsoft-com:office:powerpoint" xmlns:com="http://schemas.openxmlformats.org/drawingml/2006/compatibility" xmlns:p14="http://schemas.microsoft.com/office/powerpoint/2010/main" xmlns:p15="http://schemas.microsoft.com/office/powerpoint/2012/main" xmlns:ahyp="http://schemas.microsoft.com/office/drawing/2018/hyperlinkcolor" xmlns:go="http://customooxmlschemas.google.com/" r:id="rId61" roundtripDataSignature="AMtx7mgei7ef6iks7B7X8ITjCQ6wJRgUvA=="/>
+      <go:slidesCustomData xmlns:go="http://customooxmlschemas.google.com/" xmlns:ahyp="http://schemas.microsoft.com/office/drawing/2018/hyperlinkcolor" xmlns:p15="http://schemas.microsoft.com/office/powerpoint/2012/main" xmlns:p14="http://schemas.microsoft.com/office/powerpoint/2010/main" xmlns:com="http://schemas.openxmlformats.org/drawingml/2006/compatibility" xmlns:pvml="urn:schemas-microsoft-com:office:powerpoint" xmlns:v="urn:schemas-microsoft-com:vml" xmlns:o="urn:schemas-microsoft-com:office:office" xmlns:dgm="http://schemas.openxmlformats.org/drawingml/2006/diagram" xmlns:c="http://schemas.openxmlformats.org/drawingml/2006/chart" xmlns:mv="urn:schemas-microsoft-com:mac:vml" xmlns:mc="http://schemas.openxmlformats.org/markup-compatibility/2006" xmlns="" r:id="rId61" roundtripDataSignature="AMtx7mgei7ef6iks7B7X8ITjCQ6wJRgUvA=="/>
     </p:ext>
   </p:extLst>
 </p:presentation>
@@ -4220,7 +4221,7 @@
     </p:spTree>
     <p:extLst>
       <p:ext uri="{BB962C8B-B14F-4D97-AF65-F5344CB8AC3E}">
-        <p14:creationId xmlns:p14="http://schemas.microsoft.com/office/powerpoint/2010/main" val="2915421195"/>
+        <p14:creationId xmlns:p14="http://schemas.microsoft.com/office/powerpoint/2010/main" val="1238288016"/>
       </p:ext>
     </p:extLst>
   </p:cSld>
@@ -4347,7 +4348,7 @@
     </p:spTree>
     <p:extLst>
       <p:ext uri="{BB962C8B-B14F-4D97-AF65-F5344CB8AC3E}">
-        <p14:creationId xmlns:p14="http://schemas.microsoft.com/office/powerpoint/2010/main" val="1238288016"/>
+        <p14:creationId xmlns:p14="http://schemas.microsoft.com/office/powerpoint/2010/main" val="2915421195"/>
       </p:ext>
     </p:extLst>
   </p:cSld>
@@ -21733,18 +21734,7 @@
             </a:pPr>
             <a:r>
               <a:rPr lang="en-US" dirty="0"/>
-              <a:t>Modelling Approach – Feature Importance </a:t>
-            </a:r>
-            <a:r>
-              <a:rPr lang="en-US" dirty="0">
-                <a:solidFill>
-                  <a:srgbClr val="FF0000"/>
-                </a:solidFill>
-                <a:highlight>
-                  <a:srgbClr val="FFFF00"/>
-                </a:highlight>
-              </a:rPr>
-              <a:t>JASON</a:t>
+              <a:t>Modelling Approach - Conclusion</a:t>
             </a:r>
             <a:endParaRPr dirty="0">
               <a:solidFill>
@@ -21823,7 +21813,7 @@
         </p:nvSpPr>
         <p:spPr>
           <a:xfrm>
-            <a:off x="1248602" y="868151"/>
+            <a:off x="1165475" y="894649"/>
             <a:ext cx="6858000" cy="3725700"/>
           </a:xfrm>
           <a:prstGeom prst="rect">
@@ -22091,7 +22081,56 @@
               <a:buFont typeface="Quicksand"/>
               <a:buNone/>
             </a:pPr>
-            <a:endParaRPr lang="en-US" sz="2400" dirty="0"/>
+            <a:r>
+              <a:rPr lang="en-US" sz="2400" dirty="0"/>
+              <a:t>After comparing model outcomes, we opted for </a:t>
+            </a:r>
+            <a:r>
+              <a:rPr lang="en-US" sz="2400" b="1" dirty="0"/>
+              <a:t>RANDOM FOREST</a:t>
+            </a:r>
+            <a:r>
+              <a:rPr lang="en-US" sz="2400" dirty="0"/>
+              <a:t>:</a:t>
+            </a:r>
+          </a:p>
+          <a:p>
+            <a:pPr marL="457200" lvl="0" indent="-355600" algn="l" rtl="0">
+              <a:lnSpc>
+                <a:spcPct val="100000"/>
+              </a:lnSpc>
+              <a:spcBef>
+                <a:spcPts val="600"/>
+              </a:spcBef>
+              <a:spcAft>
+                <a:spcPts val="0"/>
+              </a:spcAft>
+              <a:buSzPts val="2000"/>
+              <a:buChar char="◦"/>
+            </a:pPr>
+            <a:r>
+              <a:rPr lang="en-US" sz="2400" dirty="0"/>
+              <a:t>92.48% Actual Accuracy</a:t>
+            </a:r>
+          </a:p>
+          <a:p>
+            <a:pPr marL="457200" lvl="0" indent="-355600" algn="l" rtl="0">
+              <a:lnSpc>
+                <a:spcPct val="100000"/>
+              </a:lnSpc>
+              <a:spcBef>
+                <a:spcPts val="600"/>
+              </a:spcBef>
+              <a:spcAft>
+                <a:spcPts val="0"/>
+              </a:spcAft>
+              <a:buSzPts val="2000"/>
+              <a:buChar char="◦"/>
+            </a:pPr>
+            <a:r>
+              <a:rPr lang="en-US" sz="2400" dirty="0"/>
+              <a:t>27 customers incorrectly predicted out of 359</a:t>
+            </a:r>
           </a:p>
           <a:p>
             <a:pPr marL="0" indent="0">
@@ -22100,24 +22139,6 @@
               <a:buNone/>
             </a:pPr>
             <a:endParaRPr lang="en-US" sz="2400" dirty="0"/>
-          </a:p>
-          <a:p>
-            <a:pPr marL="0" indent="0">
-              <a:buSzPts val="3000"/>
-              <a:buFont typeface="Quicksand"/>
-              <a:buNone/>
-            </a:pPr>
-            <a:r>
-              <a:rPr lang="en-US" sz="2400" dirty="0">
-                <a:solidFill>
-                  <a:srgbClr val="FF0000"/>
-                </a:solidFill>
-                <a:highlight>
-                  <a:srgbClr val="FFFF00"/>
-                </a:highlight>
-              </a:rPr>
-              <a:t>PLOT WITH FEATURE IMPORTANCE</a:t>
-            </a:r>
           </a:p>
           <a:p>
             <a:pPr marL="0" indent="0">
@@ -22135,7 +22156,7 @@
     </p:spTree>
     <p:extLst>
       <p:ext uri="{BB962C8B-B14F-4D97-AF65-F5344CB8AC3E}">
-        <p14:creationId xmlns:p14="http://schemas.microsoft.com/office/powerpoint/2010/main" val="3236178598"/>
+        <p14:creationId xmlns:p14="http://schemas.microsoft.com/office/powerpoint/2010/main" val="2584584787"/>
       </p:ext>
     </p:extLst>
   </p:cSld>
@@ -22206,7 +22227,7 @@
             </a:pPr>
             <a:r>
               <a:rPr lang="en-US" dirty="0"/>
-              <a:t>Modelling Approach - Conclusion</a:t>
+              <a:t>Modelling Approach – Feature Importance</a:t>
             </a:r>
             <a:endParaRPr dirty="0">
               <a:solidFill>
@@ -22285,8 +22306,8 @@
         </p:nvSpPr>
         <p:spPr>
           <a:xfrm>
-            <a:off x="1165475" y="894649"/>
-            <a:ext cx="6858000" cy="3725700"/>
+            <a:off x="1248602" y="247974"/>
+            <a:ext cx="6858000" cy="2323776"/>
           </a:xfrm>
           <a:prstGeom prst="rect">
             <a:avLst/>
@@ -22553,56 +22574,7 @@
               <a:buFont typeface="Quicksand"/>
               <a:buNone/>
             </a:pPr>
-            <a:r>
-              <a:rPr lang="en-US" sz="2400" dirty="0"/>
-              <a:t>After comparing model outcomes, we opted for </a:t>
-            </a:r>
-            <a:r>
-              <a:rPr lang="en-US" sz="2400" b="1" dirty="0"/>
-              <a:t>RANDOM FOREST</a:t>
-            </a:r>
-            <a:r>
-              <a:rPr lang="en-US" sz="2400" dirty="0"/>
-              <a:t>:</a:t>
-            </a:r>
-          </a:p>
-          <a:p>
-            <a:pPr marL="457200" lvl="0" indent="-355600" algn="l" rtl="0">
-              <a:lnSpc>
-                <a:spcPct val="100000"/>
-              </a:lnSpc>
-              <a:spcBef>
-                <a:spcPts val="600"/>
-              </a:spcBef>
-              <a:spcAft>
-                <a:spcPts val="0"/>
-              </a:spcAft>
-              <a:buSzPts val="2000"/>
-              <a:buChar char="◦"/>
-            </a:pPr>
-            <a:r>
-              <a:rPr lang="en-US" sz="2400" dirty="0"/>
-              <a:t>92.48% Actual Accuracy</a:t>
-            </a:r>
-          </a:p>
-          <a:p>
-            <a:pPr marL="457200" lvl="0" indent="-355600" algn="l" rtl="0">
-              <a:lnSpc>
-                <a:spcPct val="100000"/>
-              </a:lnSpc>
-              <a:spcBef>
-                <a:spcPts val="600"/>
-              </a:spcBef>
-              <a:spcAft>
-                <a:spcPts val="0"/>
-              </a:spcAft>
-              <a:buSzPts val="2000"/>
-              <a:buChar char="◦"/>
-            </a:pPr>
-            <a:r>
-              <a:rPr lang="en-US" sz="2400" dirty="0"/>
-              <a:t>27 customers incorrectly predicted out of 359</a:t>
-            </a:r>
+            <a:endParaRPr lang="en-US" sz="2400" dirty="0"/>
           </a:p>
           <a:p>
             <a:pPr marL="0" indent="0">
@@ -22620,15 +22592,45 @@
             </a:pPr>
             <a:r>
               <a:rPr lang="en-US" sz="2400" dirty="0"/>
-              <a:t>This model allows us to confidently make predictions.</a:t>
+              <a:t>Further exploration could occur to determine if some features were unnecessary</a:t>
             </a:r>
           </a:p>
         </p:txBody>
       </p:sp>
+      <p:pic>
+        <p:nvPicPr>
+          <p:cNvPr id="5" name="Picture 4">
+            <a:extLst>
+              <a:ext uri="{FF2B5EF4-FFF2-40B4-BE49-F238E27FC236}">
+                <a16:creationId xmlns:a16="http://schemas.microsoft.com/office/drawing/2014/main" id="{1E7AFBE0-B1A4-434C-BA26-0DF22CF1EE0C}"/>
+              </a:ext>
+            </a:extLst>
+          </p:cNvPr>
+          <p:cNvPicPr>
+            <a:picLocks noChangeAspect="1"/>
+          </p:cNvPicPr>
+          <p:nvPr/>
+        </p:nvPicPr>
+        <p:blipFill>
+          <a:blip r:embed="rId3"/>
+          <a:stretch>
+            <a:fillRect/>
+          </a:stretch>
+        </p:blipFill>
+        <p:spPr>
+          <a:xfrm>
+            <a:off x="3395117" y="2162209"/>
+            <a:ext cx="5570652" cy="2589922"/>
+          </a:xfrm>
+          <a:prstGeom prst="rect">
+            <a:avLst/>
+          </a:prstGeom>
+        </p:spPr>
+      </p:pic>
     </p:spTree>
     <p:extLst>
       <p:ext uri="{BB962C8B-B14F-4D97-AF65-F5344CB8AC3E}">
-        <p14:creationId xmlns:p14="http://schemas.microsoft.com/office/powerpoint/2010/main" val="2584584787"/>
+        <p14:creationId xmlns:p14="http://schemas.microsoft.com/office/powerpoint/2010/main" val="3236178598"/>
       </p:ext>
     </p:extLst>
   </p:cSld>
@@ -24652,8 +24654,27 @@
               <a:buSzPts val="2400"/>
               <a:buNone/>
             </a:pPr>
+            <a:endParaRPr lang="en-US" sz="1200" b="1" dirty="0"/>
+          </a:p>
+          <a:p>
+            <a:pPr marL="76200" lvl="0" indent="0" algn="l" rtl="0">
+              <a:lnSpc>
+                <a:spcPct val="100000"/>
+              </a:lnSpc>
+              <a:spcBef>
+                <a:spcPts val="600"/>
+              </a:spcBef>
+              <a:spcAft>
+                <a:spcPts val="0"/>
+              </a:spcAft>
+              <a:buClr>
+                <a:schemeClr val="accent1"/>
+              </a:buClr>
+              <a:buSzPts val="2400"/>
+              <a:buNone/>
+            </a:pPr>
             <a:r>
-              <a:rPr lang="en-US" sz="1200" dirty="0"/>
+              <a:rPr lang="en-US" sz="1200" b="1" dirty="0"/>
               <a:t>User individual selection </a:t>
             </a:r>
           </a:p>
@@ -24703,8 +24724,27 @@
               <a:buSzPts val="2400"/>
               <a:buNone/>
             </a:pPr>
+            <a:endParaRPr lang="en-US" sz="1200" b="1" dirty="0"/>
+          </a:p>
+          <a:p>
+            <a:pPr marL="76200" lvl="0" indent="0" algn="l" rtl="0">
+              <a:lnSpc>
+                <a:spcPct val="100000"/>
+              </a:lnSpc>
+              <a:spcBef>
+                <a:spcPts val="600"/>
+              </a:spcBef>
+              <a:spcAft>
+                <a:spcPts val="0"/>
+              </a:spcAft>
+              <a:buClr>
+                <a:schemeClr val="accent1"/>
+              </a:buClr>
+              <a:buSzPts val="2400"/>
+              <a:buNone/>
+            </a:pPr>
             <a:r>
-              <a:rPr lang="en-US" sz="1200" dirty="0"/>
+              <a:rPr lang="en-US" sz="1200" b="1" dirty="0"/>
               <a:t>CSV file </a:t>
             </a:r>
           </a:p>
@@ -24810,7 +24850,7 @@
                   <a:schemeClr val="bg1"/>
                 </a:solidFill>
               </a:rPr>
-              <a:t>Machine Learning</a:t>
+              <a:t>Machine Learning – imported model</a:t>
             </a:r>
           </a:p>
           <a:p>
@@ -24829,7 +24869,23 @@
                   <a:schemeClr val="bg1"/>
                 </a:solidFill>
               </a:rPr>
-              <a:t>Return results</a:t>
+              <a:t>Return results to JavaScript to </a:t>
+            </a:r>
+            <a:r>
+              <a:rPr lang="en-US" sz="1200" dirty="0" err="1">
+                <a:solidFill>
+                  <a:schemeClr val="bg1"/>
+                </a:solidFill>
+              </a:rPr>
+              <a:t>visualise</a:t>
+            </a:r>
+            <a:r>
+              <a:rPr lang="en-US" sz="1200" dirty="0">
+                <a:solidFill>
+                  <a:schemeClr val="bg1"/>
+                </a:solidFill>
+              </a:rPr>
+              <a:t> on screen</a:t>
             </a:r>
           </a:p>
           <a:p>

</xml_diff>

<commit_message>
Small change to ML slide
</commit_message>
<xml_diff>
--- a/Final Project - Presentation.pptx
+++ b/Final Project - Presentation.pptx
@@ -18585,6 +18585,22 @@
             <a:endParaRPr b="1" dirty="0"/>
           </a:p>
           <a:p>
+            <a:pPr marL="342900" lvl="0" indent="-342900"/>
+            <a:r>
+              <a:rPr lang="en-US" dirty="0"/>
+              <a:t>Decision Tree – </a:t>
+            </a:r>
+            <a:r>
+              <a:rPr lang="en-US"/>
+              <a:t>Score 0</a:t>
+            </a:r>
+            <a:r>
+              <a:rPr lang="en-AU"/>
+              <a:t>.937 </a:t>
+            </a:r>
+            <a:endParaRPr lang="en-US" dirty="0"/>
+          </a:p>
+          <a:p>
             <a:pPr marL="342900" lvl="0" indent="-342900" algn="l" rtl="0">
               <a:lnSpc>
                 <a:spcPct val="100000"/>

</xml_diff>

<commit_message>
Added speaking notes to my slides
</commit_message>
<xml_diff>
--- a/Final Project - Presentation.pptx
+++ b/Final Project - Presentation.pptx
@@ -3190,6 +3190,439 @@
           </a:bodyPr>
           <a:lstStyle/>
           <a:p>
+            <a:r>
+              <a:rPr lang="en-AU" sz="1100" b="1" i="0" u="none" strike="noStrike" cap="none" dirty="0">
+                <a:solidFill>
+                  <a:srgbClr val="000000"/>
+                </a:solidFill>
+                <a:effectLst/>
+                <a:latin typeface="Arial"/>
+                <a:ea typeface="Arial"/>
+                <a:cs typeface="Arial"/>
+                <a:sym typeface="Arial"/>
+              </a:rPr>
+              <a:t>Ordinal Categorical Features</a:t>
+            </a:r>
+          </a:p>
+          <a:p>
+            <a:r>
+              <a:rPr lang="en-AU" sz="1100" b="0" i="0" u="none" strike="noStrike" cap="none" dirty="0">
+                <a:solidFill>
+                  <a:srgbClr val="000000"/>
+                </a:solidFill>
+                <a:effectLst/>
+                <a:latin typeface="Arial"/>
+                <a:ea typeface="Arial"/>
+                <a:cs typeface="Arial"/>
+                <a:sym typeface="Arial"/>
+              </a:rPr>
+              <a:t>one class is higher than another – created by mapping the order</a:t>
+            </a:r>
+          </a:p>
+          <a:p>
+            <a:endParaRPr lang="en-AU" sz="1100" b="0" i="0" u="none" strike="noStrike" cap="none" dirty="0">
+              <a:solidFill>
+                <a:srgbClr val="000000"/>
+              </a:solidFill>
+              <a:effectLst/>
+              <a:latin typeface="Arial"/>
+              <a:ea typeface="Arial"/>
+              <a:cs typeface="Arial"/>
+              <a:sym typeface="Arial"/>
+            </a:endParaRPr>
+          </a:p>
+          <a:p>
+            <a:r>
+              <a:rPr lang="en-AU" sz="1100" b="0" i="0" u="none" strike="noStrike" cap="none" dirty="0" err="1">
+                <a:solidFill>
+                  <a:srgbClr val="000000"/>
+                </a:solidFill>
+                <a:effectLst/>
+                <a:latin typeface="Arial"/>
+                <a:ea typeface="Arial"/>
+                <a:cs typeface="Arial"/>
+                <a:sym typeface="Arial"/>
+              </a:rPr>
+              <a:t>Education_Level</a:t>
+            </a:r>
+            <a:endParaRPr lang="en-AU" sz="1100" b="0" i="0" u="none" strike="noStrike" cap="none" dirty="0">
+              <a:solidFill>
+                <a:srgbClr val="000000"/>
+              </a:solidFill>
+              <a:effectLst/>
+              <a:latin typeface="Arial"/>
+              <a:ea typeface="Arial"/>
+              <a:cs typeface="Arial"/>
+              <a:sym typeface="Arial"/>
+            </a:endParaRPr>
+          </a:p>
+          <a:p>
+            <a:r>
+              <a:rPr lang="en-AU" sz="1100" b="0" i="0" u="none" strike="noStrike" cap="none" dirty="0" err="1">
+                <a:solidFill>
+                  <a:srgbClr val="000000"/>
+                </a:solidFill>
+                <a:effectLst/>
+                <a:latin typeface="Arial"/>
+                <a:ea typeface="Arial"/>
+                <a:cs typeface="Arial"/>
+                <a:sym typeface="Arial"/>
+              </a:rPr>
+              <a:t>Income_Category</a:t>
+            </a:r>
+            <a:endParaRPr lang="en-AU" sz="1100" b="0" i="0" u="none" strike="noStrike" cap="none" dirty="0">
+              <a:solidFill>
+                <a:srgbClr val="000000"/>
+              </a:solidFill>
+              <a:effectLst/>
+              <a:latin typeface="Arial"/>
+              <a:ea typeface="Arial"/>
+              <a:cs typeface="Arial"/>
+              <a:sym typeface="Arial"/>
+            </a:endParaRPr>
+          </a:p>
+          <a:p>
+            <a:r>
+              <a:rPr lang="en-AU" sz="1100" b="0" i="0" u="none" strike="noStrike" cap="none" dirty="0">
+                <a:solidFill>
+                  <a:srgbClr val="000000"/>
+                </a:solidFill>
+                <a:effectLst/>
+                <a:latin typeface="Arial"/>
+                <a:ea typeface="Arial"/>
+                <a:cs typeface="Arial"/>
+                <a:sym typeface="Arial"/>
+              </a:rPr>
+              <a:t>Column - </a:t>
+            </a:r>
+            <a:r>
+              <a:rPr lang="en-AU" sz="1100" b="0" i="0" u="none" strike="noStrike" cap="none" dirty="0" err="1">
+                <a:solidFill>
+                  <a:srgbClr val="000000"/>
+                </a:solidFill>
+                <a:effectLst/>
+                <a:latin typeface="Arial"/>
+                <a:ea typeface="Arial"/>
+                <a:cs typeface="Arial"/>
+                <a:sym typeface="Arial"/>
+              </a:rPr>
+              <a:t>Card_Category</a:t>
+            </a:r>
+            <a:endParaRPr lang="en-AU" sz="1100" b="0" i="0" u="none" strike="noStrike" cap="none" dirty="0">
+              <a:solidFill>
+                <a:srgbClr val="000000"/>
+              </a:solidFill>
+              <a:effectLst/>
+              <a:latin typeface="Arial"/>
+              <a:ea typeface="Arial"/>
+              <a:cs typeface="Arial"/>
+              <a:sym typeface="Arial"/>
+            </a:endParaRPr>
+          </a:p>
+          <a:p>
+            <a:pPr marL="457200" marR="0" lvl="0" indent="-317500" algn="l" defTabSz="914400" rtl="0" eaLnBrk="1" fontAlgn="auto" latinLnBrk="0" hangingPunct="1">
+              <a:lnSpc>
+                <a:spcPct val="100000"/>
+              </a:lnSpc>
+              <a:spcBef>
+                <a:spcPts val="0"/>
+              </a:spcBef>
+              <a:spcAft>
+                <a:spcPts val="0"/>
+              </a:spcAft>
+              <a:buClr>
+                <a:srgbClr val="000000"/>
+              </a:buClr>
+              <a:buSzPts val="1400"/>
+              <a:buFont typeface="Arial"/>
+              <a:buChar char="●"/>
+              <a:tabLst/>
+              <a:defRPr/>
+            </a:pPr>
+            <a:endParaRPr lang="en-AU" sz="1100" b="1" i="0" u="none" strike="noStrike" cap="none" dirty="0">
+              <a:solidFill>
+                <a:srgbClr val="000000"/>
+              </a:solidFill>
+              <a:effectLst/>
+              <a:latin typeface="Arial"/>
+              <a:ea typeface="Arial"/>
+              <a:cs typeface="Arial"/>
+              <a:sym typeface="Arial"/>
+            </a:endParaRPr>
+          </a:p>
+          <a:p>
+            <a:pPr marL="457200" marR="0" lvl="0" indent="-317500" algn="l" defTabSz="914400" rtl="0" eaLnBrk="1" fontAlgn="auto" latinLnBrk="0" hangingPunct="1">
+              <a:lnSpc>
+                <a:spcPct val="100000"/>
+              </a:lnSpc>
+              <a:spcBef>
+                <a:spcPts val="0"/>
+              </a:spcBef>
+              <a:spcAft>
+                <a:spcPts val="0"/>
+              </a:spcAft>
+              <a:buClr>
+                <a:srgbClr val="000000"/>
+              </a:buClr>
+              <a:buSzPts val="1400"/>
+              <a:buFont typeface="Arial"/>
+              <a:buChar char="●"/>
+              <a:tabLst/>
+              <a:defRPr/>
+            </a:pPr>
+            <a:r>
+              <a:rPr lang="en-AU" sz="1100" b="1" i="0" u="none" strike="noStrike" cap="none" dirty="0">
+                <a:solidFill>
+                  <a:srgbClr val="000000"/>
+                </a:solidFill>
+                <a:effectLst/>
+                <a:latin typeface="Arial"/>
+                <a:ea typeface="Arial"/>
+                <a:cs typeface="Arial"/>
+                <a:sym typeface="Arial"/>
+              </a:rPr>
+              <a:t>Non-ordinal Categorical Features</a:t>
+            </a:r>
+          </a:p>
+          <a:p>
+            <a:pPr marL="457200" marR="0" lvl="0" indent="-317500" algn="l" defTabSz="914400" rtl="0" eaLnBrk="1" fontAlgn="auto" latinLnBrk="0" hangingPunct="1">
+              <a:lnSpc>
+                <a:spcPct val="100000"/>
+              </a:lnSpc>
+              <a:spcBef>
+                <a:spcPts val="0"/>
+              </a:spcBef>
+              <a:spcAft>
+                <a:spcPts val="0"/>
+              </a:spcAft>
+              <a:buClr>
+                <a:srgbClr val="000000"/>
+              </a:buClr>
+              <a:buSzPts val="1400"/>
+              <a:buFont typeface="Arial"/>
+              <a:buChar char="●"/>
+              <a:tabLst/>
+              <a:defRPr/>
+            </a:pPr>
+            <a:r>
+              <a:rPr lang="en-AU" sz="1100" b="0" i="0" u="none" strike="noStrike" cap="none" dirty="0">
+                <a:solidFill>
+                  <a:srgbClr val="000000"/>
+                </a:solidFill>
+                <a:effectLst/>
+                <a:latin typeface="Arial"/>
+                <a:ea typeface="Arial"/>
+                <a:cs typeface="Arial"/>
+                <a:sym typeface="Arial"/>
+              </a:rPr>
+              <a:t>No specific order of class – Scikit Learn </a:t>
+            </a:r>
+            <a:r>
+              <a:rPr lang="en-AU" sz="1100" b="0" i="0" u="none" strike="noStrike" cap="none" dirty="0" err="1">
+                <a:solidFill>
+                  <a:srgbClr val="000000"/>
+                </a:solidFill>
+                <a:effectLst/>
+                <a:latin typeface="Arial"/>
+                <a:ea typeface="Arial"/>
+                <a:cs typeface="Arial"/>
+                <a:sym typeface="Arial"/>
+              </a:rPr>
+              <a:t>LabelEncoder</a:t>
+            </a:r>
+            <a:endParaRPr lang="en-AU" sz="1100" b="0" i="0" u="none" strike="noStrike" cap="none" dirty="0">
+              <a:solidFill>
+                <a:srgbClr val="000000"/>
+              </a:solidFill>
+              <a:effectLst/>
+              <a:latin typeface="Arial"/>
+              <a:ea typeface="Arial"/>
+              <a:cs typeface="Arial"/>
+              <a:sym typeface="Arial"/>
+            </a:endParaRPr>
+          </a:p>
+          <a:p>
+            <a:pPr marL="457200" marR="0" lvl="0" indent="-317500" algn="l" defTabSz="914400" rtl="0" eaLnBrk="1" fontAlgn="auto" latinLnBrk="0" hangingPunct="1">
+              <a:lnSpc>
+                <a:spcPct val="100000"/>
+              </a:lnSpc>
+              <a:spcBef>
+                <a:spcPts val="0"/>
+              </a:spcBef>
+              <a:spcAft>
+                <a:spcPts val="0"/>
+              </a:spcAft>
+              <a:buClr>
+                <a:srgbClr val="000000"/>
+              </a:buClr>
+              <a:buSzPts val="1400"/>
+              <a:buFont typeface="Arial"/>
+              <a:buChar char="●"/>
+              <a:tabLst/>
+              <a:defRPr/>
+            </a:pPr>
+            <a:endParaRPr lang="en-AU" sz="1100" b="0" i="0" u="none" strike="noStrike" cap="none" dirty="0">
+              <a:solidFill>
+                <a:srgbClr val="000000"/>
+              </a:solidFill>
+              <a:effectLst/>
+              <a:latin typeface="Arial"/>
+              <a:ea typeface="Arial"/>
+              <a:cs typeface="Arial"/>
+              <a:sym typeface="Arial"/>
+            </a:endParaRPr>
+          </a:p>
+          <a:p>
+            <a:pPr marL="457200" marR="0" lvl="0" indent="-317500" algn="l" defTabSz="914400" rtl="0" eaLnBrk="1" fontAlgn="auto" latinLnBrk="0" hangingPunct="1">
+              <a:lnSpc>
+                <a:spcPct val="100000"/>
+              </a:lnSpc>
+              <a:spcBef>
+                <a:spcPts val="0"/>
+              </a:spcBef>
+              <a:spcAft>
+                <a:spcPts val="0"/>
+              </a:spcAft>
+              <a:buClr>
+                <a:srgbClr val="000000"/>
+              </a:buClr>
+              <a:buSzPts val="1400"/>
+              <a:buFont typeface="Arial"/>
+              <a:buChar char="●"/>
+              <a:tabLst/>
+              <a:defRPr/>
+            </a:pPr>
+            <a:r>
+              <a:rPr lang="en-AU" sz="1100" b="0" i="0" u="none" strike="noStrike" cap="none" dirty="0">
+                <a:solidFill>
+                  <a:srgbClr val="000000"/>
+                </a:solidFill>
+                <a:effectLst/>
+                <a:latin typeface="Arial"/>
+                <a:ea typeface="Arial"/>
+                <a:cs typeface="Arial"/>
+                <a:sym typeface="Arial"/>
+              </a:rPr>
+              <a:t>Gender</a:t>
+            </a:r>
+          </a:p>
+          <a:p>
+            <a:pPr marL="457200" marR="0" lvl="0" indent="-317500" algn="l" defTabSz="914400" rtl="0" eaLnBrk="1" fontAlgn="auto" latinLnBrk="0" hangingPunct="1">
+              <a:lnSpc>
+                <a:spcPct val="100000"/>
+              </a:lnSpc>
+              <a:spcBef>
+                <a:spcPts val="0"/>
+              </a:spcBef>
+              <a:spcAft>
+                <a:spcPts val="0"/>
+              </a:spcAft>
+              <a:buClr>
+                <a:srgbClr val="000000"/>
+              </a:buClr>
+              <a:buSzPts val="1400"/>
+              <a:buFont typeface="Arial"/>
+              <a:buChar char="●"/>
+              <a:tabLst/>
+              <a:defRPr/>
+            </a:pPr>
+            <a:r>
+              <a:rPr lang="en-AU" sz="1100" b="0" i="0" u="none" strike="noStrike" cap="none" dirty="0" err="1">
+                <a:solidFill>
+                  <a:srgbClr val="000000"/>
+                </a:solidFill>
+                <a:effectLst/>
+                <a:latin typeface="Arial"/>
+                <a:ea typeface="Arial"/>
+                <a:cs typeface="Arial"/>
+                <a:sym typeface="Arial"/>
+              </a:rPr>
+              <a:t>Marital_Status</a:t>
+            </a:r>
+            <a:endParaRPr lang="en-AU" sz="1100" b="0" i="0" u="none" strike="noStrike" cap="none" dirty="0">
+              <a:solidFill>
+                <a:srgbClr val="000000"/>
+              </a:solidFill>
+              <a:effectLst/>
+              <a:latin typeface="Arial"/>
+              <a:ea typeface="Arial"/>
+              <a:cs typeface="Arial"/>
+              <a:sym typeface="Arial"/>
+            </a:endParaRPr>
+          </a:p>
+          <a:p>
+            <a:pPr marL="457200" marR="0" lvl="0" indent="-317500" algn="l" defTabSz="914400" rtl="0" eaLnBrk="1" fontAlgn="auto" latinLnBrk="0" hangingPunct="1">
+              <a:lnSpc>
+                <a:spcPct val="100000"/>
+              </a:lnSpc>
+              <a:spcBef>
+                <a:spcPts val="0"/>
+              </a:spcBef>
+              <a:spcAft>
+                <a:spcPts val="0"/>
+              </a:spcAft>
+              <a:buClr>
+                <a:srgbClr val="000000"/>
+              </a:buClr>
+              <a:buSzPts val="1400"/>
+              <a:buFont typeface="Arial"/>
+              <a:buChar char="●"/>
+              <a:tabLst/>
+              <a:defRPr/>
+            </a:pPr>
+            <a:r>
+              <a:rPr lang="en-AU" sz="1100" b="1" i="0" u="none" strike="noStrike" cap="none" dirty="0">
+                <a:solidFill>
+                  <a:srgbClr val="000000"/>
+                </a:solidFill>
+                <a:effectLst/>
+                <a:latin typeface="Arial"/>
+                <a:ea typeface="Arial"/>
+                <a:cs typeface="Arial"/>
+                <a:sym typeface="Arial"/>
+              </a:rPr>
+              <a:t>Also scaled using </a:t>
+            </a:r>
+            <a:r>
+              <a:rPr lang="en-AU" sz="1100" b="1" i="0" u="none" strike="noStrike" cap="none" dirty="0" err="1">
+                <a:solidFill>
+                  <a:srgbClr val="000000"/>
+                </a:solidFill>
+                <a:effectLst/>
+                <a:latin typeface="Arial"/>
+                <a:ea typeface="Arial"/>
+                <a:cs typeface="Arial"/>
+                <a:sym typeface="Arial"/>
+              </a:rPr>
+              <a:t>MinMaxScaler</a:t>
+            </a:r>
+            <a:r>
+              <a:rPr lang="en-AU" sz="1100" b="1" i="0" u="none" strike="noStrike" cap="none" dirty="0">
+                <a:solidFill>
+                  <a:srgbClr val="000000"/>
+                </a:solidFill>
+                <a:effectLst/>
+                <a:latin typeface="Arial"/>
+                <a:ea typeface="Arial"/>
+                <a:cs typeface="Arial"/>
+                <a:sym typeface="Arial"/>
+              </a:rPr>
+              <a:t> – but only for continuous data – Wanted to leave the categorical features are their integers – which had its own challenges</a:t>
+            </a:r>
+          </a:p>
+          <a:p>
+            <a:endParaRPr lang="en-AU" sz="1100" b="0" i="0" u="none" strike="noStrike" cap="none" dirty="0">
+              <a:solidFill>
+                <a:srgbClr val="000000"/>
+              </a:solidFill>
+              <a:effectLst/>
+              <a:latin typeface="Arial"/>
+              <a:ea typeface="Arial"/>
+              <a:cs typeface="Arial"/>
+              <a:sym typeface="Arial"/>
+            </a:endParaRPr>
+          </a:p>
+          <a:p>
             <a:pPr marL="0" lvl="0" indent="0" algn="l" rtl="0">
               <a:lnSpc>
                 <a:spcPct val="100000"/>
@@ -3203,7 +3636,7 @@
               <a:buSzPts val="1400"/>
               <a:buNone/>
             </a:pPr>
-            <a:endParaRPr/>
+            <a:endParaRPr dirty="0"/>
           </a:p>
         </p:txBody>
       </p:sp>
@@ -3585,7 +4018,7 @@
             </a:pPr>
             <a:r>
               <a:rPr lang="en-AU" dirty="0"/>
-              <a:t>Trialling 4 model, you can see that there was three vying for top place, but the winner is the Random Forest. </a:t>
+              <a:t>Trialling 4 models, you can see that there was three vying for top place, but the clear winner is the Random Forest. </a:t>
             </a:r>
           </a:p>
           <a:p>
@@ -3603,7 +4036,7 @@
             </a:pPr>
             <a:r>
               <a:rPr lang="en-AU" dirty="0"/>
-              <a:t>This result was achieved without a Grid Search – I found that running a Grid Search could take quite a bit of time for the computer to process. If time was permitting, it would have interesting to see if it would have resulted in a better score. </a:t>
+              <a:t>This result was achieved without completing a Grid Search – I found that running a Grid Search could take quite a bit of time for the computer to process. If time was permitting, it would have interesting to see if it would have resulted in a better score. </a:t>
             </a:r>
           </a:p>
           <a:p>
@@ -4253,7 +4686,15 @@
             </a:pPr>
             <a:r>
               <a:rPr lang="en-AU" dirty="0"/>
-              <a:t>I did a comparison data frame the success slightly dipped but still happy with this accuracy</a:t>
+              <a:t>I did a comparison </a:t>
+            </a:r>
+            <a:r>
+              <a:rPr lang="en-AU" dirty="0" err="1"/>
+              <a:t>dataframe</a:t>
+            </a:r>
+            <a:r>
+              <a:rPr lang="en-AU" dirty="0"/>
+              <a:t> with the ACTUAL success rate slightly dipping but we were still happy with this accuracy</a:t>
             </a:r>
           </a:p>
           <a:p>
@@ -4415,10 +4856,9 @@
               <a:buSzPts val="1400"/>
             </a:pPr>
             <a:r>
-              <a:rPr lang="en-AU" dirty="0" err="1"/>
-              <a:t>Open_To_Buy</a:t>
+              <a:rPr lang="en-AU" dirty="0"/>
+              <a:t>It shows that the data of most relevance is around the amount of money customers have available and the amount of transaction carried out.</a:t>
             </a:r>
-            <a:endParaRPr lang="en-AU" dirty="0"/>
           </a:p>
           <a:p>
             <a:pPr marL="171450" lvl="0" indent="-171450" algn="l" rtl="0">
@@ -4435,27 +4875,8 @@
             </a:pPr>
             <a:r>
               <a:rPr lang="en-AU" dirty="0"/>
-              <a:t>Total_Amt_Chng_Q4_Q1</a:t>
+              <a:t>The customer demographics are all at the lower end of importance.</a:t>
             </a:r>
-          </a:p>
-          <a:p>
-            <a:pPr marL="171450" lvl="0" indent="-171450" algn="l" rtl="0">
-              <a:lnSpc>
-                <a:spcPct val="100000"/>
-              </a:lnSpc>
-              <a:spcBef>
-                <a:spcPts val="0"/>
-              </a:spcBef>
-              <a:spcAft>
-                <a:spcPts val="0"/>
-              </a:spcAft>
-              <a:buSzPts val="1400"/>
-            </a:pPr>
-            <a:r>
-              <a:rPr lang="en-AU" dirty="0" err="1"/>
-              <a:t>Trans_Amt</a:t>
-            </a:r>
-            <a:endParaRPr lang="en-AU" dirty="0"/>
           </a:p>
           <a:p>
             <a:pPr marL="171450" lvl="0" indent="-171450" algn="l" rtl="0">
@@ -4472,7 +4893,7 @@
             </a:pPr>
             <a:r>
               <a:rPr lang="en-AU" dirty="0"/>
-              <a:t>Contacts_Count_12_mon</a:t>
+              <a:t>More analyses could be done around whether those with less credit available are the ones who are the ultimate churn risk.</a:t>
             </a:r>
           </a:p>
           <a:p>
@@ -4488,56 +4909,10 @@
               </a:spcAft>
               <a:buSzPts val="1400"/>
             </a:pPr>
-            <a:r>
-              <a:rPr lang="en-AU" dirty="0" err="1"/>
-              <a:t>Card_Category</a:t>
-            </a:r>
-            <a:endParaRPr lang="en-AU" dirty="0"/>
-          </a:p>
-          <a:p>
-            <a:pPr marL="171450" lvl="0" indent="-171450" algn="l" rtl="0">
-              <a:lnSpc>
-                <a:spcPct val="100000"/>
-              </a:lnSpc>
-              <a:spcBef>
-                <a:spcPts val="0"/>
-              </a:spcBef>
-              <a:spcAft>
-                <a:spcPts val="0"/>
-              </a:spcAft>
-              <a:buSzPts val="1400"/>
-            </a:pPr>
-            <a:r>
-              <a:rPr lang="en-AU" dirty="0" err="1"/>
-              <a:t>Total_Trans_Ct</a:t>
-            </a:r>
             <a:r>
               <a:rPr lang="en-AU" dirty="0"/>
-              <a:t>’),</a:t>
+              <a:t>And whether dropping the demographics data would impact the accuracy.</a:t>
             </a:r>
-          </a:p>
-          <a:p>
-            <a:pPr marL="171450" lvl="0" indent="-171450" algn="l" rtl="0">
-              <a:lnSpc>
-                <a:spcPct val="100000"/>
-              </a:lnSpc>
-              <a:spcBef>
-                <a:spcPts val="0"/>
-              </a:spcBef>
-              <a:spcAft>
-                <a:spcPts val="0"/>
-              </a:spcAft>
-              <a:buSzPts val="1400"/>
-            </a:pPr>
-            <a:r>
-              <a:rPr lang="en-AU" dirty="0" err="1"/>
-              <a:t>Total_Revolving_Bal</a:t>
-            </a:r>
-            <a:r>
-              <a:rPr lang="en-AU" dirty="0"/>
-              <a:t>'</a:t>
-            </a:r>
-            <a:endParaRPr dirty="0"/>
           </a:p>
         </p:txBody>
       </p:sp>
@@ -5408,7 +5783,7 @@
           </a:bodyPr>
           <a:lstStyle/>
           <a:p>
-            <a:pPr marL="0" lvl="0" indent="0" algn="l" rtl="0">
+            <a:pPr marL="171450" lvl="0" indent="-171450" algn="l" rtl="0">
               <a:lnSpc>
                 <a:spcPct val="100000"/>
               </a:lnSpc>
@@ -5419,9 +5794,198 @@
                 <a:spcPts val="0"/>
               </a:spcAft>
               <a:buSzPts val="1400"/>
-              <a:buNone/>
-            </a:pPr>
-            <a:endParaRPr/>
+            </a:pPr>
+            <a:r>
+              <a:rPr lang="en-AU" dirty="0"/>
+              <a:t>Two routes</a:t>
+            </a:r>
+          </a:p>
+          <a:p>
+            <a:pPr marL="171450" lvl="0" indent="-171450" algn="l" rtl="0">
+              <a:lnSpc>
+                <a:spcPct val="100000"/>
+              </a:lnSpc>
+              <a:spcBef>
+                <a:spcPts val="0"/>
+              </a:spcBef>
+              <a:spcAft>
+                <a:spcPts val="0"/>
+              </a:spcAft>
+              <a:buSzPts val="1400"/>
+            </a:pPr>
+            <a:r>
+              <a:rPr lang="en-AU" dirty="0"/>
+              <a:t>Individual – input from the web form</a:t>
+            </a:r>
+          </a:p>
+          <a:p>
+            <a:pPr marL="171450" lvl="0" indent="-171450" algn="l" rtl="0">
+              <a:lnSpc>
+                <a:spcPct val="100000"/>
+              </a:lnSpc>
+              <a:spcBef>
+                <a:spcPts val="0"/>
+              </a:spcBef>
+              <a:spcAft>
+                <a:spcPts val="0"/>
+              </a:spcAft>
+              <a:buSzPts val="1400"/>
+            </a:pPr>
+            <a:r>
+              <a:rPr lang="en-AU" dirty="0"/>
+              <a:t>Bulk – input from the csv</a:t>
+            </a:r>
+          </a:p>
+          <a:p>
+            <a:pPr marL="171450" lvl="0" indent="-171450" algn="l" rtl="0">
+              <a:lnSpc>
+                <a:spcPct val="100000"/>
+              </a:lnSpc>
+              <a:spcBef>
+                <a:spcPts val="0"/>
+              </a:spcBef>
+              <a:spcAft>
+                <a:spcPts val="0"/>
+              </a:spcAft>
+              <a:buSzPts val="1400"/>
+            </a:pPr>
+            <a:endParaRPr lang="en-AU" dirty="0"/>
+          </a:p>
+          <a:p>
+            <a:pPr marL="171450" lvl="0" indent="-171450" algn="l" rtl="0">
+              <a:lnSpc>
+                <a:spcPct val="100000"/>
+              </a:lnSpc>
+              <a:spcBef>
+                <a:spcPts val="0"/>
+              </a:spcBef>
+              <a:spcAft>
+                <a:spcPts val="0"/>
+              </a:spcAft>
+              <a:buSzPts val="1400"/>
+            </a:pPr>
+            <a:r>
+              <a:rPr lang="en-AU" dirty="0"/>
+              <a:t>Input had to go through the full process of:</a:t>
+            </a:r>
+          </a:p>
+          <a:p>
+            <a:pPr marL="171450" lvl="0" indent="-171450" algn="l" rtl="0">
+              <a:lnSpc>
+                <a:spcPct val="100000"/>
+              </a:lnSpc>
+              <a:spcBef>
+                <a:spcPts val="0"/>
+              </a:spcBef>
+              <a:spcAft>
+                <a:spcPts val="0"/>
+              </a:spcAft>
+              <a:buSzPts val="1400"/>
+            </a:pPr>
+            <a:r>
+              <a:rPr lang="en-AU" dirty="0"/>
+              <a:t>Encoding – bulk only / for individual prediction categorical input was captured as numerical input from the web  from</a:t>
+            </a:r>
+          </a:p>
+          <a:p>
+            <a:pPr marL="171450" lvl="0" indent="-171450" algn="l" rtl="0">
+              <a:lnSpc>
+                <a:spcPct val="100000"/>
+              </a:lnSpc>
+              <a:spcBef>
+                <a:spcPts val="0"/>
+              </a:spcBef>
+              <a:spcAft>
+                <a:spcPts val="0"/>
+              </a:spcAft>
+              <a:buSzPts val="1400"/>
+            </a:pPr>
+            <a:r>
+              <a:rPr lang="en-AU" dirty="0"/>
+              <a:t>Scaling – imported model</a:t>
+            </a:r>
+          </a:p>
+          <a:p>
+            <a:pPr marL="171450" lvl="0" indent="-171450" algn="l" rtl="0">
+              <a:lnSpc>
+                <a:spcPct val="100000"/>
+              </a:lnSpc>
+              <a:spcBef>
+                <a:spcPts val="0"/>
+              </a:spcBef>
+              <a:spcAft>
+                <a:spcPts val="0"/>
+              </a:spcAft>
+              <a:buSzPts val="1400"/>
+            </a:pPr>
+            <a:r>
+              <a:rPr lang="en-AU" dirty="0"/>
+              <a:t>Machine Learning – imported model</a:t>
+            </a:r>
+          </a:p>
+          <a:p>
+            <a:pPr marL="171450" lvl="0" indent="-171450" algn="l" rtl="0">
+              <a:lnSpc>
+                <a:spcPct val="100000"/>
+              </a:lnSpc>
+              <a:spcBef>
+                <a:spcPts val="0"/>
+              </a:spcBef>
+              <a:spcAft>
+                <a:spcPts val="0"/>
+              </a:spcAft>
+              <a:buSzPts val="1400"/>
+            </a:pPr>
+            <a:r>
+              <a:rPr lang="en-AU" dirty="0"/>
+              <a:t>Returned the outcome to </a:t>
+            </a:r>
+            <a:r>
+              <a:rPr lang="en-AU" dirty="0" err="1"/>
+              <a:t>javascript</a:t>
+            </a:r>
+            <a:endParaRPr lang="en-AU" dirty="0"/>
+          </a:p>
+          <a:p>
+            <a:pPr marL="171450" lvl="0" indent="-171450" algn="l" rtl="0">
+              <a:lnSpc>
+                <a:spcPct val="100000"/>
+              </a:lnSpc>
+              <a:spcBef>
+                <a:spcPts val="0"/>
+              </a:spcBef>
+              <a:spcAft>
+                <a:spcPts val="0"/>
+              </a:spcAft>
+              <a:buSzPts val="1400"/>
+            </a:pPr>
+            <a:endParaRPr lang="en-AU" dirty="0"/>
+          </a:p>
+          <a:p>
+            <a:pPr marL="171450" lvl="0" indent="-171450" algn="l" rtl="0">
+              <a:lnSpc>
+                <a:spcPct val="100000"/>
+              </a:lnSpc>
+              <a:spcBef>
+                <a:spcPts val="0"/>
+              </a:spcBef>
+              <a:spcAft>
+                <a:spcPts val="0"/>
+              </a:spcAft>
+              <a:buSzPts val="1400"/>
+            </a:pPr>
+            <a:r>
+              <a:rPr lang="en-AU" dirty="0"/>
+              <a:t>The struggle was that returning data to </a:t>
+            </a:r>
+            <a:r>
+              <a:rPr lang="en-AU" dirty="0" err="1"/>
+              <a:t>javascript</a:t>
+            </a:r>
+            <a:r>
+              <a:rPr lang="en-AU" dirty="0"/>
+              <a:t> was a issue - process for individual didn’t work for bulk so that took a lot of problem solving.</a:t>
+            </a:r>
           </a:p>
         </p:txBody>
       </p:sp>

</xml_diff>